<commit_message>
Typing and formatting changes
</commit_message>
<xml_diff>
--- a/src/examplePresentations/ExampleTablesOutput.pptx
+++ b/src/examplePresentations/ExampleTablesOutput.pptx
@@ -3370,7 +3370,7 @@
         </p:nvGraphicFramePr>
         <p:xfrm>
           <a:off x="2032000" y="719666"/>
-          <a:ext cx="8127999" cy="1112520"/>
+          <a:ext cx="8127999" cy="1010920"/>
         </p:xfrm>
         <a:graphic>
           <a:graphicData uri="http://schemas.openxmlformats.org/drawingml/2006/table">
@@ -3529,7 +3529,7 @@
                 </a:tc>
                 <a:extLst>
                   <a:ext uri="{0D108BD9-81ED-4DB2-BD59-A6C34878D82A}">
-                    <a16:rowId xmlns:a16="http://schemas.microsoft.com/office/drawing/2014/main" val="2676232248"/>
+                    <a16:rowId xmlns:a16="http://schemas.microsoft.com/office/drawing/2014/main" val="3415760747"/>
                   </a:ext>
                 </a:extLst>
               </a:tr>
@@ -3589,7 +3589,7 @@
         </p:nvGraphicFramePr>
         <p:xfrm>
           <a:off x="1012054" y="719666"/>
-          <a:ext cx="10795248" cy="1112520"/>
+          <a:ext cx="10795248" cy="741680"/>
         </p:xfrm>
         <a:graphic>
           <a:graphicData uri="http://schemas.openxmlformats.org/drawingml/2006/table">
@@ -3748,7 +3748,7 @@
                 </a:tc>
                 <a:extLst>
                   <a:ext uri="{0D108BD9-81ED-4DB2-BD59-A6C34878D82A}">
-                    <a16:rowId xmlns:a16="http://schemas.microsoft.com/office/drawing/2014/main" val="3071768889"/>
+                    <a16:rowId xmlns:a16="http://schemas.microsoft.com/office/drawing/2014/main" val="3415760747"/>
                   </a:ext>
                 </a:extLst>
               </a:tr>

</xml_diff>